<commit_message>
Jos jedan update pred NG
</commit_message>
<xml_diff>
--- a/Predavanja/Predavanje_06_Resenje_Milneovog_Problema.pptx
+++ b/Predavanja/Predavanje_06_Resenje_Milneovog_Problema.pptx
@@ -7889,10 +7889,10 @@
                 <a:ea typeface="Microsoft YaHei" pitchFamily="2"/>
                 <a:cs typeface="Arial" pitchFamily="2"/>
               </a:rPr>
-              <a:t>: Siva </a:t>
-            </a:r>
-            <a:r>
-              <a:rPr lang="en-US" sz="3200" b="0" i="0" u="none" strike="noStrike" kern="1200" cap="none" dirty="0" err="1">
+              <a:t>: Re</a:t>
+            </a:r>
+            <a:r>
+              <a:rPr lang="sr-Latn-RS" sz="3200" b="0" i="0" u="none" strike="noStrike" kern="1200" cap="none" dirty="0">
                 <a:ln>
                   <a:noFill/>
                 </a:ln>
@@ -7905,71 +7905,7 @@
                 <a:ea typeface="Microsoft YaHei" pitchFamily="2"/>
                 <a:cs typeface="Arial" pitchFamily="2"/>
               </a:rPr>
-              <a:t>Atmosfera</a:t>
-            </a:r>
-            <a:r>
-              <a:rPr lang="en-US" sz="3200" b="0" i="0" u="none" strike="noStrike" kern="1200" cap="none" dirty="0">
-                <a:ln>
-                  <a:noFill/>
-                </a:ln>
-                <a:highlight>
-                  <a:scrgbClr r="0" g="0" b="0">
-                    <a:alpha val="0"/>
-                  </a:scrgbClr>
-                </a:highlight>
-                <a:latin typeface="Rubik" pitchFamily="18"/>
-                <a:ea typeface="Microsoft YaHei" pitchFamily="2"/>
-                <a:cs typeface="Arial" pitchFamily="2"/>
-              </a:rPr>
-              <a:t> u </a:t>
-            </a:r>
-            <a:r>
-              <a:rPr lang="en-US" sz="3200" b="0" i="0" u="none" strike="noStrike" kern="1200" cap="none" dirty="0" err="1">
-                <a:ln>
-                  <a:noFill/>
-                </a:ln>
-                <a:highlight>
-                  <a:scrgbClr r="0" g="0" b="0">
-                    <a:alpha val="0"/>
-                  </a:scrgbClr>
-                </a:highlight>
-                <a:latin typeface="Rubik" pitchFamily="18"/>
-                <a:ea typeface="Microsoft YaHei" pitchFamily="2"/>
-                <a:cs typeface="Arial" pitchFamily="2"/>
-              </a:rPr>
-              <a:t>Ravnoteži</a:t>
-            </a:r>
-            <a:r>
-              <a:rPr lang="en-US" sz="3200" b="0" i="0" u="none" strike="noStrike" kern="1200" cap="none" dirty="0">
-                <a:ln>
-                  <a:noFill/>
-                </a:ln>
-                <a:highlight>
-                  <a:scrgbClr r="0" g="0" b="0">
-                    <a:alpha val="0"/>
-                  </a:scrgbClr>
-                </a:highlight>
-                <a:latin typeface="Rubik" pitchFamily="18"/>
-                <a:ea typeface="Microsoft YaHei" pitchFamily="2"/>
-                <a:cs typeface="Arial" pitchFamily="2"/>
-              </a:rPr>
-              <a:t> </a:t>
-            </a:r>
-            <a:r>
-              <a:rPr lang="en-US" sz="3200" b="0" i="0" u="none" strike="noStrike" kern="1200" cap="none" dirty="0" err="1">
-                <a:ln>
-                  <a:noFill/>
-                </a:ln>
-                <a:highlight>
-                  <a:scrgbClr r="0" g="0" b="0">
-                    <a:alpha val="0"/>
-                  </a:scrgbClr>
-                </a:highlight>
-                <a:latin typeface="Rubik" pitchFamily="18"/>
-                <a:ea typeface="Microsoft YaHei" pitchFamily="2"/>
-                <a:cs typeface="Arial" pitchFamily="2"/>
-              </a:rPr>
-              <a:t>Zračenja</a:t>
+              <a:t>šavanje Milneovog Problema</a:t>
             </a:r>
             <a:endParaRPr lang="en-US" sz="3200" b="0" i="0" u="none" strike="noStrike" kern="1200" cap="none" dirty="0">
               <a:ln>
@@ -11440,7 +11376,12 @@
             <p:ph type="body" idx="4294967295"/>
           </p:nvPr>
         </p:nvSpPr>
-        <p:spPr/>
+        <p:spPr>
+          <a:xfrm>
+            <a:off x="276840" y="914039"/>
+            <a:ext cx="9099635" cy="4446360"/>
+          </a:xfrm>
+        </p:spPr>
         <p:txBody>
           <a:bodyPr/>
           <a:lstStyle/>
@@ -12525,7 +12466,7 @@
         <p:spPr>
           <a:xfrm>
             <a:off x="685799" y="4464000"/>
-            <a:ext cx="4343400" cy="633240"/>
+            <a:ext cx="4171679" cy="633240"/>
           </a:xfrm>
           <a:prstGeom prst="rect">
             <a:avLst/>
@@ -12536,7 +12477,7 @@
           </a:ln>
         </p:spPr>
         <p:txBody>
-          <a:bodyPr vert="horz" wrap="none" lIns="90000" tIns="45000" rIns="90000" bIns="45000" anchorCtr="0" compatLnSpc="0">
+          <a:bodyPr vert="horz" wrap="square" lIns="90000" tIns="45000" rIns="90000" bIns="45000" anchorCtr="0" compatLnSpc="0">
             <a:spAutoFit/>
           </a:bodyPr>
           <a:lstStyle/>
@@ -12555,7 +12496,7 @@
               <a:tabLst/>
             </a:pPr>
             <a:r>
-              <a:rPr lang="en-US" sz="1800" b="0" i="0" u="none" strike="noStrike" kern="1200" cap="none">
+              <a:rPr lang="en-US" sz="1800" b="0" i="0" u="none" strike="noStrike" kern="1200" cap="none" dirty="0">
                 <a:ln>
                   <a:noFill/>
                 </a:ln>
@@ -12563,7 +12504,117 @@
                 <a:ea typeface="Microsoft YaHei" pitchFamily="2"/>
                 <a:cs typeface="Arial" pitchFamily="2"/>
               </a:rPr>
-              <a:t>Kako naći konstantu C? Diskusija nekoliko minuta.</a:t>
+              <a:t>Kako </a:t>
+            </a:r>
+            <a:r>
+              <a:rPr lang="en-US" sz="1800" b="0" i="0" u="none" strike="noStrike" kern="1200" cap="none" dirty="0" err="1">
+                <a:ln>
+                  <a:noFill/>
+                </a:ln>
+                <a:latin typeface="Rubik Light" pitchFamily="18"/>
+                <a:ea typeface="Microsoft YaHei" pitchFamily="2"/>
+                <a:cs typeface="Arial" pitchFamily="2"/>
+              </a:rPr>
+              <a:t>naći</a:t>
+            </a:r>
+            <a:r>
+              <a:rPr lang="en-US" sz="1800" b="0" i="0" u="none" strike="noStrike" kern="1200" cap="none" dirty="0">
+                <a:ln>
+                  <a:noFill/>
+                </a:ln>
+                <a:latin typeface="Rubik Light" pitchFamily="18"/>
+                <a:ea typeface="Microsoft YaHei" pitchFamily="2"/>
+                <a:cs typeface="Arial" pitchFamily="2"/>
+              </a:rPr>
+              <a:t> </a:t>
+            </a:r>
+            <a:r>
+              <a:rPr lang="en-US" sz="1800" b="0" i="0" u="none" strike="noStrike" kern="1200" cap="none" dirty="0" err="1">
+                <a:ln>
+                  <a:noFill/>
+                </a:ln>
+                <a:latin typeface="Rubik Light" pitchFamily="18"/>
+                <a:ea typeface="Microsoft YaHei" pitchFamily="2"/>
+                <a:cs typeface="Arial" pitchFamily="2"/>
+              </a:rPr>
+              <a:t>konstantu</a:t>
+            </a:r>
+            <a:r>
+              <a:rPr lang="en-US" sz="1800" b="0" i="0" u="none" strike="noStrike" kern="1200" cap="none" dirty="0">
+                <a:ln>
+                  <a:noFill/>
+                </a:ln>
+                <a:latin typeface="Rubik Light" pitchFamily="18"/>
+                <a:ea typeface="Microsoft YaHei" pitchFamily="2"/>
+                <a:cs typeface="Arial" pitchFamily="2"/>
+              </a:rPr>
+              <a:t> C? </a:t>
+            </a:r>
+            <a:r>
+              <a:rPr lang="en-US" sz="1800" b="0" i="0" u="none" strike="noStrike" kern="1200" cap="none" dirty="0" err="1">
+                <a:ln>
+                  <a:noFill/>
+                </a:ln>
+                <a:latin typeface="Rubik Light" pitchFamily="18"/>
+                <a:ea typeface="Microsoft YaHei" pitchFamily="2"/>
+                <a:cs typeface="Arial" pitchFamily="2"/>
+              </a:rPr>
+              <a:t>Diskusija</a:t>
+            </a:r>
+            <a:r>
+              <a:rPr lang="en-US" sz="1800" b="0" i="0" u="none" strike="noStrike" kern="1200" cap="none" dirty="0">
+                <a:ln>
+                  <a:noFill/>
+                </a:ln>
+                <a:latin typeface="Rubik Light" pitchFamily="18"/>
+                <a:ea typeface="Microsoft YaHei" pitchFamily="2"/>
+                <a:cs typeface="Arial" pitchFamily="2"/>
+              </a:rPr>
+              <a:t> </a:t>
+            </a:r>
+            <a:r>
+              <a:rPr lang="en-US" sz="1800" b="0" i="0" u="none" strike="noStrike" kern="1200" cap="none" dirty="0" err="1">
+                <a:ln>
+                  <a:noFill/>
+                </a:ln>
+                <a:latin typeface="Rubik Light" pitchFamily="18"/>
+                <a:ea typeface="Microsoft YaHei" pitchFamily="2"/>
+                <a:cs typeface="Arial" pitchFamily="2"/>
+              </a:rPr>
+              <a:t>nekoliko</a:t>
+            </a:r>
+            <a:r>
+              <a:rPr lang="en-US" sz="1800" b="0" i="0" u="none" strike="noStrike" kern="1200" cap="none" dirty="0">
+                <a:ln>
+                  <a:noFill/>
+                </a:ln>
+                <a:latin typeface="Rubik Light" pitchFamily="18"/>
+                <a:ea typeface="Microsoft YaHei" pitchFamily="2"/>
+                <a:cs typeface="Arial" pitchFamily="2"/>
+              </a:rPr>
+              <a:t> </a:t>
+            </a:r>
+            <a:r>
+              <a:rPr lang="en-US" sz="1800" b="0" i="0" u="none" strike="noStrike" kern="1200" cap="none" dirty="0" err="1">
+                <a:ln>
+                  <a:noFill/>
+                </a:ln>
+                <a:latin typeface="Rubik Light" pitchFamily="18"/>
+                <a:ea typeface="Microsoft YaHei" pitchFamily="2"/>
+                <a:cs typeface="Arial" pitchFamily="2"/>
+              </a:rPr>
+              <a:t>minuta</a:t>
+            </a:r>
+            <a:r>
+              <a:rPr lang="en-US" sz="1800" b="0" i="0" u="none" strike="noStrike" kern="1200" cap="none" dirty="0">
+                <a:ln>
+                  <a:noFill/>
+                </a:ln>
+                <a:latin typeface="Rubik Light" pitchFamily="18"/>
+                <a:ea typeface="Microsoft YaHei" pitchFamily="2"/>
+                <a:cs typeface="Arial" pitchFamily="2"/>
+              </a:rPr>
+              <a:t>.</a:t>
             </a:r>
           </a:p>
         </p:txBody>
@@ -12719,8 +12770,8 @@
         </p:nvSpPr>
         <p:spPr>
           <a:xfrm>
-            <a:off x="685799" y="4066200"/>
-            <a:ext cx="4246201" cy="1447560"/>
+            <a:off x="685799" y="3905099"/>
+            <a:ext cx="4466880" cy="1447560"/>
           </a:xfrm>
           <a:prstGeom prst="rect">
             <a:avLst/>

</xml_diff>